<commit_message>
Adding test cases to try to reproduce errors in tbd, not reproducing with simplified cases
</commit_message>
<xml_diff>
--- a/spec/test_cases/Holes.pptx
+++ b/spec/test_cases/Holes.pptx
@@ -114,6 +114,11 @@
       </a:defRPr>
     </a:lvl9pPr>
   </p:defaultTextStyle>
+  <p:extLst>
+    <p:ext uri="{EFAFB233-063F-42B5-8137-9DF3F51BA10A}">
+      <p15:sldGuideLst xmlns:p15="http://schemas.microsoft.com/office/powerpoint/2012/main"/>
+    </p:ext>
+  </p:extLst>
 </p:presentation>
 </file>
 
@@ -264,7 +269,7 @@
           <a:p>
             <a:fld id="{55EC49DF-3B2E-43E2-8A0F-960DE980094C}" type="datetimeFigureOut">
               <a:rPr lang="en-US" smtClean="0"/>
-              <a:t>8/21/2020</a:t>
+              <a:t>8/29/2020</a:t>
             </a:fld>
             <a:endParaRPr lang="en-US"/>
           </a:p>
@@ -462,7 +467,7 @@
           <a:p>
             <a:fld id="{55EC49DF-3B2E-43E2-8A0F-960DE980094C}" type="datetimeFigureOut">
               <a:rPr lang="en-US" smtClean="0"/>
-              <a:t>8/21/2020</a:t>
+              <a:t>8/29/2020</a:t>
             </a:fld>
             <a:endParaRPr lang="en-US"/>
           </a:p>
@@ -670,7 +675,7 @@
           <a:p>
             <a:fld id="{55EC49DF-3B2E-43E2-8A0F-960DE980094C}" type="datetimeFigureOut">
               <a:rPr lang="en-US" smtClean="0"/>
-              <a:t>8/21/2020</a:t>
+              <a:t>8/29/2020</a:t>
             </a:fld>
             <a:endParaRPr lang="en-US"/>
           </a:p>
@@ -868,7 +873,7 @@
           <a:p>
             <a:fld id="{55EC49DF-3B2E-43E2-8A0F-960DE980094C}" type="datetimeFigureOut">
               <a:rPr lang="en-US" smtClean="0"/>
-              <a:t>8/21/2020</a:t>
+              <a:t>8/29/2020</a:t>
             </a:fld>
             <a:endParaRPr lang="en-US"/>
           </a:p>
@@ -1143,7 +1148,7 @@
           <a:p>
             <a:fld id="{55EC49DF-3B2E-43E2-8A0F-960DE980094C}" type="datetimeFigureOut">
               <a:rPr lang="en-US" smtClean="0"/>
-              <a:t>8/21/2020</a:t>
+              <a:t>8/29/2020</a:t>
             </a:fld>
             <a:endParaRPr lang="en-US"/>
           </a:p>
@@ -1408,7 +1413,7 @@
           <a:p>
             <a:fld id="{55EC49DF-3B2E-43E2-8A0F-960DE980094C}" type="datetimeFigureOut">
               <a:rPr lang="en-US" smtClean="0"/>
-              <a:t>8/21/2020</a:t>
+              <a:t>8/29/2020</a:t>
             </a:fld>
             <a:endParaRPr lang="en-US"/>
           </a:p>
@@ -1820,7 +1825,7 @@
           <a:p>
             <a:fld id="{55EC49DF-3B2E-43E2-8A0F-960DE980094C}" type="datetimeFigureOut">
               <a:rPr lang="en-US" smtClean="0"/>
-              <a:t>8/21/2020</a:t>
+              <a:t>8/29/2020</a:t>
             </a:fld>
             <a:endParaRPr lang="en-US"/>
           </a:p>
@@ -1961,7 +1966,7 @@
           <a:p>
             <a:fld id="{55EC49DF-3B2E-43E2-8A0F-960DE980094C}" type="datetimeFigureOut">
               <a:rPr lang="en-US" smtClean="0"/>
-              <a:t>8/21/2020</a:t>
+              <a:t>8/29/2020</a:t>
             </a:fld>
             <a:endParaRPr lang="en-US"/>
           </a:p>
@@ -2074,7 +2079,7 @@
           <a:p>
             <a:fld id="{55EC49DF-3B2E-43E2-8A0F-960DE980094C}" type="datetimeFigureOut">
               <a:rPr lang="en-US" smtClean="0"/>
-              <a:t>8/21/2020</a:t>
+              <a:t>8/29/2020</a:t>
             </a:fld>
             <a:endParaRPr lang="en-US"/>
           </a:p>
@@ -2385,7 +2390,7 @@
           <a:p>
             <a:fld id="{55EC49DF-3B2E-43E2-8A0F-960DE980094C}" type="datetimeFigureOut">
               <a:rPr lang="en-US" smtClean="0"/>
-              <a:t>8/21/2020</a:t>
+              <a:t>8/29/2020</a:t>
             </a:fld>
             <a:endParaRPr lang="en-US"/>
           </a:p>
@@ -2673,7 +2678,7 @@
           <a:p>
             <a:fld id="{55EC49DF-3B2E-43E2-8A0F-960DE980094C}" type="datetimeFigureOut">
               <a:rPr lang="en-US" smtClean="0"/>
-              <a:t>8/21/2020</a:t>
+              <a:t>8/29/2020</a:t>
             </a:fld>
             <a:endParaRPr lang="en-US"/>
           </a:p>
@@ -2914,7 +2919,7 @@
           <a:p>
             <a:fld id="{55EC49DF-3B2E-43E2-8A0F-960DE980094C}" type="datetimeFigureOut">
               <a:rPr lang="en-US" smtClean="0"/>
-              <a:t>8/21/2020</a:t>
+              <a:t>8/29/2020</a:t>
             </a:fld>
             <a:endParaRPr lang="en-US"/>
           </a:p>
@@ -4331,6 +4336,47 @@
           </a:fontRef>
         </p:style>
       </p:cxnSp>
+      <p:sp>
+        <p:nvSpPr>
+          <p:cNvPr id="13" name="TextBox 12">
+            <a:extLst>
+              <a:ext uri="{FF2B5EF4-FFF2-40B4-BE49-F238E27FC236}">
+                <a16:creationId xmlns:a16="http://schemas.microsoft.com/office/drawing/2014/main" id="{C7ABA71F-C4C7-4E3E-8F5B-F360862E3AC7}"/>
+              </a:ext>
+            </a:extLst>
+          </p:cNvPr>
+          <p:cNvSpPr txBox="1"/>
+          <p:nvPr/>
+        </p:nvSpPr>
+        <p:spPr>
+          <a:xfrm>
+            <a:off x="9332167" y="2770024"/>
+            <a:ext cx="2814873" cy="954107"/>
+          </a:xfrm>
+          <a:prstGeom prst="rect">
+            <a:avLst/>
+          </a:prstGeom>
+          <a:noFill/>
+        </p:spPr>
+        <p:txBody>
+          <a:bodyPr wrap="none" rtlCol="0">
+            <a:spAutoFit/>
+          </a:bodyPr>
+          <a:lstStyle/>
+          <a:p>
+            <a:r>
+              <a:rPr lang="en-US" sz="2800" dirty="0"/>
+              <a:t>Overlapping holes</a:t>
+            </a:r>
+          </a:p>
+          <a:p>
+            <a:r>
+              <a:rPr lang="en-US" sz="2800" dirty="0"/>
+              <a:t>Not supported</a:t>
+            </a:r>
+          </a:p>
+        </p:txBody>
+      </p:sp>
     </p:spTree>
     <p:extLst>
       <p:ext uri="{BB962C8B-B14F-4D97-AF65-F5344CB8AC3E}">
@@ -4979,6 +5025,47 @@
           </a:fontRef>
         </p:style>
       </p:cxnSp>
+      <p:sp>
+        <p:nvSpPr>
+          <p:cNvPr id="3" name="TextBox 2">
+            <a:extLst>
+              <a:ext uri="{FF2B5EF4-FFF2-40B4-BE49-F238E27FC236}">
+                <a16:creationId xmlns:a16="http://schemas.microsoft.com/office/drawing/2014/main" id="{960FA141-583A-4A1E-97C7-2A219607F6D8}"/>
+              </a:ext>
+            </a:extLst>
+          </p:cNvPr>
+          <p:cNvSpPr txBox="1"/>
+          <p:nvPr/>
+        </p:nvSpPr>
+        <p:spPr>
+          <a:xfrm>
+            <a:off x="9332167" y="2770024"/>
+            <a:ext cx="2814873" cy="954107"/>
+          </a:xfrm>
+          <a:prstGeom prst="rect">
+            <a:avLst/>
+          </a:prstGeom>
+          <a:noFill/>
+        </p:spPr>
+        <p:txBody>
+          <a:bodyPr wrap="none" rtlCol="0">
+            <a:spAutoFit/>
+          </a:bodyPr>
+          <a:lstStyle/>
+          <a:p>
+            <a:r>
+              <a:rPr lang="en-US" sz="2800" dirty="0"/>
+              <a:t>Overlapping holes</a:t>
+            </a:r>
+          </a:p>
+          <a:p>
+            <a:r>
+              <a:rPr lang="en-US" sz="2800" dirty="0"/>
+              <a:t>Not supported</a:t>
+            </a:r>
+          </a:p>
+        </p:txBody>
+      </p:sp>
     </p:spTree>
     <p:extLst>
       <p:ext uri="{BB962C8B-B14F-4D97-AF65-F5344CB8AC3E}">

</xml_diff>